<commit_message>
small spelling errors, move wordcloud import, small eval bug, adde pickle model
</commit_message>
<xml_diff>
--- a/final_presentation/FellowshipAI_challenge_terror_groups_samuel_king_final_presentation.pptx
+++ b/final_presentation/FellowshipAI_challenge_terror_groups_samuel_king_final_presentation.pptx
@@ -348,7 +348,7 @@
           <a:p>
             <a:fld id="{C8A3AA5B-E851-47C0-AA22-627AA98E1E9D}" type="datetimeFigureOut">
               <a:rPr lang="en-GB" smtClean="0"/>
-              <a:t>30/11/2018</a:t>
+              <a:t>03/12/2018</a:t>
             </a:fld>
             <a:endParaRPr lang="en-GB"/>
           </a:p>
@@ -548,7 +548,7 @@
           <a:p>
             <a:fld id="{C8A3AA5B-E851-47C0-AA22-627AA98E1E9D}" type="datetimeFigureOut">
               <a:rPr lang="en-GB" smtClean="0"/>
-              <a:t>30/11/2018</a:t>
+              <a:t>03/12/2018</a:t>
             </a:fld>
             <a:endParaRPr lang="en-GB"/>
           </a:p>
@@ -758,7 +758,7 @@
           <a:p>
             <a:fld id="{C8A3AA5B-E851-47C0-AA22-627AA98E1E9D}" type="datetimeFigureOut">
               <a:rPr lang="en-GB" smtClean="0"/>
-              <a:t>30/11/2018</a:t>
+              <a:t>03/12/2018</a:t>
             </a:fld>
             <a:endParaRPr lang="en-GB"/>
           </a:p>
@@ -958,7 +958,7 @@
           <a:p>
             <a:fld id="{C8A3AA5B-E851-47C0-AA22-627AA98E1E9D}" type="datetimeFigureOut">
               <a:rPr lang="en-GB" smtClean="0"/>
-              <a:t>30/11/2018</a:t>
+              <a:t>03/12/2018</a:t>
             </a:fld>
             <a:endParaRPr lang="en-GB"/>
           </a:p>
@@ -1234,7 +1234,7 @@
           <a:p>
             <a:fld id="{C8A3AA5B-E851-47C0-AA22-627AA98E1E9D}" type="datetimeFigureOut">
               <a:rPr lang="en-GB" smtClean="0"/>
-              <a:t>30/11/2018</a:t>
+              <a:t>03/12/2018</a:t>
             </a:fld>
             <a:endParaRPr lang="en-GB"/>
           </a:p>
@@ -1502,7 +1502,7 @@
           <a:p>
             <a:fld id="{C8A3AA5B-E851-47C0-AA22-627AA98E1E9D}" type="datetimeFigureOut">
               <a:rPr lang="en-GB" smtClean="0"/>
-              <a:t>30/11/2018</a:t>
+              <a:t>03/12/2018</a:t>
             </a:fld>
             <a:endParaRPr lang="en-GB"/>
           </a:p>
@@ -1917,7 +1917,7 @@
           <a:p>
             <a:fld id="{C8A3AA5B-E851-47C0-AA22-627AA98E1E9D}" type="datetimeFigureOut">
               <a:rPr lang="en-GB" smtClean="0"/>
-              <a:t>30/11/2018</a:t>
+              <a:t>03/12/2018</a:t>
             </a:fld>
             <a:endParaRPr lang="en-GB"/>
           </a:p>
@@ -2059,7 +2059,7 @@
           <a:p>
             <a:fld id="{C8A3AA5B-E851-47C0-AA22-627AA98E1E9D}" type="datetimeFigureOut">
               <a:rPr lang="en-GB" smtClean="0"/>
-              <a:t>30/11/2018</a:t>
+              <a:t>03/12/2018</a:t>
             </a:fld>
             <a:endParaRPr lang="en-GB"/>
           </a:p>
@@ -2172,7 +2172,7 @@
           <a:p>
             <a:fld id="{C8A3AA5B-E851-47C0-AA22-627AA98E1E9D}" type="datetimeFigureOut">
               <a:rPr lang="en-GB" smtClean="0"/>
-              <a:t>30/11/2018</a:t>
+              <a:t>03/12/2018</a:t>
             </a:fld>
             <a:endParaRPr lang="en-GB"/>
           </a:p>
@@ -2485,7 +2485,7 @@
           <a:p>
             <a:fld id="{C8A3AA5B-E851-47C0-AA22-627AA98E1E9D}" type="datetimeFigureOut">
               <a:rPr lang="en-GB" smtClean="0"/>
-              <a:t>30/11/2018</a:t>
+              <a:t>03/12/2018</a:t>
             </a:fld>
             <a:endParaRPr lang="en-GB"/>
           </a:p>
@@ -2774,7 +2774,7 @@
           <a:p>
             <a:fld id="{C8A3AA5B-E851-47C0-AA22-627AA98E1E9D}" type="datetimeFigureOut">
               <a:rPr lang="en-GB" smtClean="0"/>
-              <a:t>30/11/2018</a:t>
+              <a:t>03/12/2018</a:t>
             </a:fld>
             <a:endParaRPr lang="en-GB"/>
           </a:p>
@@ -3017,7 +3017,7 @@
           <a:p>
             <a:fld id="{C8A3AA5B-E851-47C0-AA22-627AA98E1E9D}" type="datetimeFigureOut">
               <a:rPr lang="en-GB" smtClean="0"/>
-              <a:t>30/11/2018</a:t>
+              <a:t>03/12/2018</a:t>
             </a:fld>
             <a:endParaRPr lang="en-GB"/>
           </a:p>
@@ -11614,7 +11614,19 @@
               <a:rPr lang="en-GB" sz="2400" dirty="0">
                 <a:latin typeface="Abadi" panose="020B0604020104020204" pitchFamily="34" charset="0"/>
               </a:rPr>
-              <a:t>It is important to set clear real-world project goals in order to help define and focus down the technical aims of analysis </a:t>
+              <a:t>It is important to set </a:t>
+            </a:r>
+            <a:r>
+              <a:rPr lang="en-GB" sz="2400" b="1" dirty="0">
+                <a:latin typeface="Abadi" panose="020B0604020104020204" pitchFamily="34" charset="0"/>
+              </a:rPr>
+              <a:t>clear real-world project goals </a:t>
+            </a:r>
+            <a:r>
+              <a:rPr lang="en-GB" sz="2400" dirty="0">
+                <a:latin typeface="Abadi" panose="020B0604020104020204" pitchFamily="34" charset="0"/>
+              </a:rPr>
+              <a:t>in order to help define and focus down the technical aims of analysis </a:t>
             </a:r>
           </a:p>
           <a:p>
@@ -11626,7 +11638,19 @@
               <a:rPr lang="en-GB" sz="2400" dirty="0">
                 <a:latin typeface="Abadi" panose="020B0604020104020204" pitchFamily="34" charset="0"/>
               </a:rPr>
-              <a:t>The strong link between group activity and locationality means geographic variables are very predictive and there is a good reason to make regionally specific models</a:t>
+              <a:t>The strong link between group activity and locationality means </a:t>
+            </a:r>
+            <a:r>
+              <a:rPr lang="en-GB" sz="2400" b="1" dirty="0">
+                <a:latin typeface="Abadi" panose="020B0604020104020204" pitchFamily="34" charset="0"/>
+              </a:rPr>
+              <a:t>geographic variables are very predictive </a:t>
+            </a:r>
+            <a:r>
+              <a:rPr lang="en-GB" sz="2400" dirty="0">
+                <a:latin typeface="Abadi" panose="020B0604020104020204" pitchFamily="34" charset="0"/>
+              </a:rPr>
+              <a:t>and there is a good reason to make regionally specific models</a:t>
             </a:r>
           </a:p>
           <a:p>
@@ -11638,7 +11662,19 @@
               <a:rPr lang="en-GB" sz="2400" dirty="0">
                 <a:latin typeface="Abadi" panose="020B0604020104020204" pitchFamily="34" charset="0"/>
               </a:rPr>
-              <a:t>Given regional specificity it made sense for this analysis to focus on Middle East and North Africa due to a large number of attacks in the area suggesting the project may have most impact here </a:t>
+              <a:t>Given regional specificity it made sense for this analysis to </a:t>
+            </a:r>
+            <a:r>
+              <a:rPr lang="en-GB" sz="2400" b="1" dirty="0">
+                <a:latin typeface="Abadi" panose="020B0604020104020204" pitchFamily="34" charset="0"/>
+              </a:rPr>
+              <a:t>focus on Middle East and North Africa </a:t>
+            </a:r>
+            <a:r>
+              <a:rPr lang="en-GB" sz="2400" dirty="0">
+                <a:latin typeface="Abadi" panose="020B0604020104020204" pitchFamily="34" charset="0"/>
+              </a:rPr>
+              <a:t>due to a large number of attacks in the area suggesting the project may have most impact here </a:t>
             </a:r>
           </a:p>
           <a:p>
@@ -11650,7 +11686,13 @@
               <a:rPr lang="en-GB" sz="2400" dirty="0">
                 <a:latin typeface="Abadi" panose="020B0604020104020204" pitchFamily="34" charset="0"/>
               </a:rPr>
-              <a:t>Given the disproportionate impact a small number of active groups have it made sense to also focus analysis onto these most active groups </a:t>
+              <a:t>Given the disproportionate impact a small number of active groups have it made sense to also </a:t>
+            </a:r>
+            <a:r>
+              <a:rPr lang="en-GB" sz="2400" b="1" dirty="0">
+                <a:latin typeface="Abadi" panose="020B0604020104020204" pitchFamily="34" charset="0"/>
+              </a:rPr>
+              <a:t>focus analysis onto these most active groups </a:t>
             </a:r>
           </a:p>
           <a:p>
@@ -11662,7 +11704,25 @@
               <a:rPr lang="en-GB" sz="2400" dirty="0">
                 <a:latin typeface="Abadi" panose="020B0604020104020204" pitchFamily="34" charset="0"/>
               </a:rPr>
-              <a:t>For groups operating in the same geographic areas, cleaning and selecting other variables like nationality of victims attacked and method of attack proved significant discriminators</a:t>
+              <a:t>For groups operating in the same geographic areas, </a:t>
+            </a:r>
+            <a:r>
+              <a:rPr lang="en-GB" sz="2400" b="1" dirty="0">
+                <a:latin typeface="Abadi" panose="020B0604020104020204" pitchFamily="34" charset="0"/>
+              </a:rPr>
+              <a:t>cleaning and selecting other variables </a:t>
+            </a:r>
+            <a:r>
+              <a:rPr lang="en-GB" sz="2400" dirty="0">
+                <a:latin typeface="Abadi" panose="020B0604020104020204" pitchFamily="34" charset="0"/>
+              </a:rPr>
+              <a:t>like nationality of victims attacked and method of attack </a:t>
+            </a:r>
+            <a:r>
+              <a:rPr lang="en-GB" sz="2400" b="1" dirty="0">
+                <a:latin typeface="Abadi" panose="020B0604020104020204" pitchFamily="34" charset="0"/>
+              </a:rPr>
+              <a:t>proved significant discriminators</a:t>
             </a:r>
           </a:p>
           <a:p>
@@ -11671,10 +11731,16 @@
               <a:buAutoNum type="arabicPeriod"/>
             </a:pPr>
             <a:r>
+              <a:rPr lang="en-GB" sz="2400" b="1" dirty="0">
+                <a:latin typeface="Abadi" panose="020B0604020104020204" pitchFamily="34" charset="0"/>
+              </a:rPr>
+              <a:t>Non-linear ensemble models worked well </a:t>
+            </a:r>
+            <a:r>
               <a:rPr lang="en-GB" sz="2400" dirty="0">
                 <a:latin typeface="Abadi" panose="020B0604020104020204" pitchFamily="34" charset="0"/>
               </a:rPr>
-              <a:t>Non-linear ensemble models worked well for this data set, likely due to their ability to deal well with unbalanced classes, the large number of possible variables, and the fact that many of these were categorical variables</a:t>
+              <a:t>for this data set, likely due to their ability to deal well with unbalanced classes, the large number of possible variables, and the fact that many of these were categorical variables</a:t>
             </a:r>
           </a:p>
           <a:p>
@@ -11686,7 +11752,19 @@
               <a:rPr lang="en-GB" sz="2400" dirty="0">
                 <a:latin typeface="Abadi" panose="020B0604020104020204" pitchFamily="34" charset="0"/>
               </a:rPr>
-              <a:t>Using precision as the cost function for this problem makes sense as we want to be confident we are right if we are going to assign responsibility to a group to make potentially deadly policy decisions </a:t>
+              <a:t>Using </a:t>
+            </a:r>
+            <a:r>
+              <a:rPr lang="en-GB" sz="2400" b="1" dirty="0">
+                <a:latin typeface="Abadi" panose="020B0604020104020204" pitchFamily="34" charset="0"/>
+              </a:rPr>
+              <a:t>precision as the cost function </a:t>
+            </a:r>
+            <a:r>
+              <a:rPr lang="en-GB" sz="2400" dirty="0">
+                <a:latin typeface="Abadi" panose="020B0604020104020204" pitchFamily="34" charset="0"/>
+              </a:rPr>
+              <a:t>for this problem makes sense as we want to be confident we are right if we are going to assign responsibility to a group to make potentially deadly policy decisions </a:t>
             </a:r>
           </a:p>
           <a:p>
@@ -11698,7 +11776,19 @@
               <a:rPr lang="en-GB" sz="2400" dirty="0">
                 <a:latin typeface="Abadi" panose="020B0604020104020204" pitchFamily="34" charset="0"/>
               </a:rPr>
-              <a:t>Using NLP to create new features from text info on the attacks was not able to significantly improve results, though more work may be able to draw more signal out of this </a:t>
+              <a:t>Using NLP to create new features from </a:t>
+            </a:r>
+            <a:r>
+              <a:rPr lang="en-GB" sz="2400" b="1" dirty="0">
+                <a:latin typeface="Abadi" panose="020B0604020104020204" pitchFamily="34" charset="0"/>
+              </a:rPr>
+              <a:t>text info on the attacks was not able to significantly improve results</a:t>
+            </a:r>
+            <a:r>
+              <a:rPr lang="en-GB" sz="2400" dirty="0">
+                <a:latin typeface="Abadi" panose="020B0604020104020204" pitchFamily="34" charset="0"/>
+              </a:rPr>
+              <a:t>, though more work may be able to draw more signal out of this </a:t>
             </a:r>
           </a:p>
           <a:p>
@@ -11707,10 +11797,16 @@
               <a:buAutoNum type="arabicPeriod"/>
             </a:pPr>
             <a:r>
+              <a:rPr lang="en-GB" sz="2400" b="1" dirty="0">
+                <a:latin typeface="Abadi" panose="020B0604020104020204" pitchFamily="34" charset="0"/>
+              </a:rPr>
+              <a:t>Tuning model parameters was able to improve performance</a:t>
+            </a:r>
+            <a:r>
               <a:rPr lang="en-GB" sz="2400" dirty="0">
                 <a:latin typeface="Abadi" panose="020B0604020104020204" pitchFamily="34" charset="0"/>
               </a:rPr>
-              <a:t>Tuning model parameters was able to improve performance for the best performing ensemble method,  with results standing up well even to hidden evaluation sets the model has never seen before </a:t>
+              <a:t> for the best performing ensemble method,  with results standing up well even to hidden evaluation sets the model has never seen before </a:t>
             </a:r>
           </a:p>
           <a:p>
@@ -11722,7 +11818,31 @@
               <a:rPr lang="en-GB" sz="2400" dirty="0">
                 <a:latin typeface="Abadi" panose="020B0604020104020204" pitchFamily="34" charset="0"/>
               </a:rPr>
-              <a:t>This model could be deployed to help attribute responsibility for recent and new unknown attacks in the Middle East and could thus feed evidence for policy decisions in the area, such as which groups to target </a:t>
+              <a:t>This model could be </a:t>
+            </a:r>
+            <a:r>
+              <a:rPr lang="en-GB" sz="2400" b="1" dirty="0">
+                <a:latin typeface="Abadi" panose="020B0604020104020204" pitchFamily="34" charset="0"/>
+              </a:rPr>
+              <a:t>deployed to help attribute responsibility for recent and new unknown attacks </a:t>
+            </a:r>
+            <a:r>
+              <a:rPr lang="en-GB" sz="2400" dirty="0">
+                <a:latin typeface="Abadi" panose="020B0604020104020204" pitchFamily="34" charset="0"/>
+              </a:rPr>
+              <a:t>in the Middle East and could thus </a:t>
+            </a:r>
+            <a:r>
+              <a:rPr lang="en-GB" sz="2400" b="1" dirty="0">
+                <a:latin typeface="Abadi" panose="020B0604020104020204" pitchFamily="34" charset="0"/>
+              </a:rPr>
+              <a:t>feed evidence for policy decisions in the area</a:t>
+            </a:r>
+            <a:r>
+              <a:rPr lang="en-GB" sz="2400" dirty="0">
+                <a:latin typeface="Abadi" panose="020B0604020104020204" pitchFamily="34" charset="0"/>
+              </a:rPr>
+              <a:t>, such as which groups to target </a:t>
             </a:r>
           </a:p>
         </p:txBody>
@@ -11916,7 +12036,19 @@
               <a:rPr lang="en-US" sz="1600" dirty="0">
                 <a:latin typeface="Abadi" panose="020B0604020104020204" pitchFamily="34" charset="0"/>
               </a:rPr>
-              <a:t>While only looking at the top groups provided a good way to reduce down the problem space while still capturing the highest value targets, this approach does present two problems. Firstly it means the currently model is unable to capture the long-tail of other smaller outfits which may per salient to understand from a policy perspective (i.e. being able to identify and shut-down groups which are increasingly violent early may be beneficial from a policy angle). Moreover only giving the model the target space of these top groups will mean it is only able to classify attacks as being carried out by one of these groups, potentially meaning that salient patterns from other smaller groups are always hidden by this models outputs. This could be improved by extending the analysis out to all known groups, though this could come with new issues such as a greater need for balancing classes etc. </a:t>
+              <a:t>While </a:t>
+            </a:r>
+            <a:r>
+              <a:rPr lang="en-US" sz="1600" b="1" dirty="0">
+                <a:latin typeface="Abadi" panose="020B0604020104020204" pitchFamily="34" charset="0"/>
+              </a:rPr>
+              <a:t>only looking at the top groups </a:t>
+            </a:r>
+            <a:r>
+              <a:rPr lang="en-US" sz="1600" dirty="0">
+                <a:latin typeface="Abadi" panose="020B0604020104020204" pitchFamily="34" charset="0"/>
+              </a:rPr>
+              <a:t>provided a good way to reduce down the problem space while still capturing the highest value targets, this approach does present two problems. Firstly it means the currently model is unable to capture the long-tail of other smaller outfits which may be salient to understand from a policy perspective (i.e. being able to identify and shut-down groups which are increasingly violent early may be beneficial from a policy angle). Moreover only giving the model the target space of these top groups will mean it is only able to classify attacks as being carried out by one of these groups, potentially meaning that salient patterns from other smaller groups are always hidden by this model’s outputs. This could be improved by extending the analysis out to all known groups, though this could come with new issues such as a greater need for balancing classes etc. </a:t>
             </a:r>
           </a:p>
           <a:p>
@@ -11928,7 +12060,19 @@
               <a:rPr lang="en-US" sz="1600" dirty="0">
                 <a:latin typeface="Abadi" panose="020B0604020104020204" pitchFamily="34" charset="0"/>
               </a:rPr>
-              <a:t>There is still some concern given the non-linear nature of the final models and the relatively small amount of data (meaning only a small evaluation set could be used) that the model is still over fitting to some extent. This could be improved by testing the model across further evaluation sets (i.e. having a larger K for the cross-validation of the last step), as well as double checking them are no bugs meaning that data from training sets are being used for this evaluation. </a:t>
+              <a:t>There is still some concern given the non-linear nature of the final models and the relatively small amount of data (meaning only a small evaluation set could be used) that the </a:t>
+            </a:r>
+            <a:r>
+              <a:rPr lang="en-US" sz="1600" b="1" dirty="0">
+                <a:latin typeface="Abadi" panose="020B0604020104020204" pitchFamily="34" charset="0"/>
+              </a:rPr>
+              <a:t>model is still over fitting to some extent</a:t>
+            </a:r>
+            <a:r>
+              <a:rPr lang="en-US" sz="1600" dirty="0">
+                <a:latin typeface="Abadi" panose="020B0604020104020204" pitchFamily="34" charset="0"/>
+              </a:rPr>
+              <a:t>. This could be improved by testing the model across further evaluation sets (i.e. having a larger K for the cross-validation of the last step), as well as double checking them are no bugs meaning that data from training sets is being used in evaluation. </a:t>
             </a:r>
           </a:p>
           <a:p>
@@ -11940,7 +12084,19 @@
               <a:rPr lang="en-US" sz="1600" dirty="0">
                 <a:latin typeface="Abadi" panose="020B0604020104020204" pitchFamily="34" charset="0"/>
               </a:rPr>
-              <a:t>If more time was available more effort could also be put into tuning the final model with only a small set of hyperparameters for the single best performing model used. This could be improved by doing a more exhaustive grid search of the final model as well as other top performing models to ensure optimal tuning. </a:t>
+              <a:t>If more time was available more effort could also be put into </a:t>
+            </a:r>
+            <a:r>
+              <a:rPr lang="en-US" sz="1600" b="1" dirty="0">
+                <a:latin typeface="Abadi" panose="020B0604020104020204" pitchFamily="34" charset="0"/>
+              </a:rPr>
+              <a:t>tuning the final model </a:t>
+            </a:r>
+            <a:r>
+              <a:rPr lang="en-US" sz="1600" dirty="0">
+                <a:latin typeface="Abadi" panose="020B0604020104020204" pitchFamily="34" charset="0"/>
+              </a:rPr>
+              <a:t>with only a small set of hyperparameters for the single best performing model used. This could be improved by doing a more exhaustive grid search of the final model as well as other top performing models to ensure optimal tuning. The best strategy to do this would be to host the source code on an (AWS EC2) instance and allow the search to run on a dedicated server. </a:t>
             </a:r>
           </a:p>
           <a:p>
@@ -11952,7 +12108,19 @@
               <a:rPr lang="en-US" sz="1600" dirty="0">
                 <a:latin typeface="Abadi" panose="020B0604020104020204" pitchFamily="34" charset="0"/>
               </a:rPr>
-              <a:t>While precision made sense to use in this problem, it may also be worth revisiting the cost function and using something more sophisticated like weighted F1 with a beta-score balanced between recall and precision depending on real-world priorities. </a:t>
+              <a:t>While precision made sense to use in this problem, it may also be </a:t>
+            </a:r>
+            <a:r>
+              <a:rPr lang="en-US" sz="1600" b="1" dirty="0">
+                <a:latin typeface="Abadi" panose="020B0604020104020204" pitchFamily="34" charset="0"/>
+              </a:rPr>
+              <a:t>worth revisiting the cost function </a:t>
+            </a:r>
+            <a:r>
+              <a:rPr lang="en-US" sz="1600" dirty="0">
+                <a:latin typeface="Abadi" panose="020B0604020104020204" pitchFamily="34" charset="0"/>
+              </a:rPr>
+              <a:t>and using something more sophisticated like weighted F1 with a beta-score balanced between recall and precision depending on real-world priorities. This would require further refining of the project goals. </a:t>
             </a:r>
           </a:p>
           <a:p>
@@ -11961,10 +12129,16 @@
               <a:buAutoNum type="arabicPeriod"/>
             </a:pPr>
             <a:r>
+              <a:rPr lang="en-US" sz="1600" b="1" dirty="0">
+                <a:latin typeface="Abadi" panose="020B0604020104020204" pitchFamily="34" charset="0"/>
+              </a:rPr>
+              <a:t>Terrorism is a complex topic and evolves over time </a:t>
+            </a:r>
+            <a:r>
               <a:rPr lang="en-US" sz="1600" dirty="0">
                 <a:latin typeface="Abadi" panose="020B0604020104020204" pitchFamily="34" charset="0"/>
               </a:rPr>
-              <a:t>Terrorism is a complex topic and evolves over time (e.g. new groups could emerge, old groups might change leadership and faction off into different distinct groups, or new lone-wolf actors could emerge acting differently from the group they are supposed to represent). This suggest that we would need to get new data from the GTD and review their definitions regularly, as well as retraining the model itself often. </a:t>
+              <a:t>(e.g. new groups could emerge, old groups might change leadership and faction off into different distinct groups, or new lone-wolf actors could emerge acting differently from the group they are supposed to represent). This suggest that we would need to get new data from the GTD and review their definitions regularly, as well as retraining the model itself often</a:t>
             </a:r>
           </a:p>
           <a:p>
@@ -11976,7 +12150,19 @@
               <a:rPr lang="en-US" sz="1600" dirty="0">
                 <a:latin typeface="Abadi" panose="020B0604020104020204" pitchFamily="34" charset="0"/>
               </a:rPr>
-              <a:t>Linked to the point above, it should also be noted that there is a good likelihood, considering the domain space, that parts of the data itself are labelled wrong. If this model was put in deployment the inputs and results would need to be assessed carefully to guard against issues this could cause. </a:t>
+              <a:t>Linked to the point above, it should also be noted that there is a good likelihood, considering the domain space, that parts of the </a:t>
+            </a:r>
+            <a:r>
+              <a:rPr lang="en-US" sz="1600" b="1" dirty="0">
+                <a:latin typeface="Abadi" panose="020B0604020104020204" pitchFamily="34" charset="0"/>
+              </a:rPr>
+              <a:t>data itself are labelled wrong</a:t>
+            </a:r>
+            <a:r>
+              <a:rPr lang="en-US" sz="1600" dirty="0">
+                <a:latin typeface="Abadi" panose="020B0604020104020204" pitchFamily="34" charset="0"/>
+              </a:rPr>
+              <a:t>. If this model was put in deployment the inputs and results would need to be assessed carefully to guard against issues this could cause. </a:t>
             </a:r>
           </a:p>
         </p:txBody>
@@ -12176,7 +12362,7 @@
               <a:rPr lang="en-US" sz="2000" dirty="0">
                 <a:latin typeface="Abadi" panose="020B0604020104020204" pitchFamily="34" charset="0"/>
               </a:rPr>
-              <a:t>As this analysis only covered the Middle East, it would be interesting and potentially valuable to extend this framework out to additional regions </a:t>
+              <a:t>As this analysis only covered the Middle East, it would be interesting and potentially valuable to extend this framework out to additional regions, functions have been built with regionally specific inputs to make this easier.  </a:t>
             </a:r>
             <a:endParaRPr lang="en-US" sz="2000" b="1" dirty="0">
               <a:latin typeface="Abadi" panose="020B0604020104020204" pitchFamily="34" charset="0"/>
@@ -12197,7 +12383,7 @@
               <a:rPr lang="en-US" sz="2000" dirty="0">
                 <a:latin typeface="Abadi" panose="020B0604020104020204" pitchFamily="34" charset="0"/>
               </a:rPr>
-              <a:t>As previously noted, extending the model to cover smaller groups would help improve the real-world value of this model and help identify trends in smaller but growing groups </a:t>
+              <a:t>As previously noted, extending the model to cover the long-tail of smaller groups would improve the real-world value of this model by helping identify anomaly attacks as well as trends in smaller but growing groups </a:t>
             </a:r>
           </a:p>
           <a:p>
@@ -12215,7 +12401,7 @@
               <a:rPr lang="en-US" sz="2000" dirty="0">
                 <a:latin typeface="Abadi" panose="020B0604020104020204" pitchFamily="34" charset="0"/>
               </a:rPr>
-              <a:t>Considering the high relevance of country as a predictive factor it may be fruitful to refine the model down even further to tune it for on a per-country basis </a:t>
+              <a:t>Considering the high relevance of country as a predictive factor it may be fruitful to refine the model down even further to tune it on a per-country basis </a:t>
             </a:r>
             <a:endParaRPr lang="en-US" sz="2000" b="1" dirty="0">
               <a:latin typeface="Abadi" panose="020B0604020104020204" pitchFamily="34" charset="0"/>
@@ -12269,7 +12455,7 @@
               <a:rPr lang="en-US" sz="2000" dirty="0">
                 <a:latin typeface="Abadi" panose="020B0604020104020204" pitchFamily="34" charset="0"/>
               </a:rPr>
-              <a:t> While attempts were made to feature engineer useful variables from text fields with minimal success, more work could be done to try an push this idea further to see if certain key words related to groups motivations or related news on the attack could help to identify the group responsible </a:t>
+              <a:t> While attempts were made to feature engineer useful variables from text fields, more work could be done to try and push this idea further to see if certain key words (or groups of words) related to terror groups motivations or related news on the attack could help to identify the group responsible </a:t>
             </a:r>
           </a:p>
           <a:p>

</xml_diff>

<commit_message>
updated V3 output graph
</commit_message>
<xml_diff>
--- a/final_presentation/FellowshipAI_challenge_terror_groups_samuel_king_final_presentation.pptx
+++ b/final_presentation/FellowshipAI_challenge_terror_groups_samuel_king_final_presentation.pptx
@@ -8856,7 +8856,7 @@
         <p:spPr>
           <a:xfrm>
             <a:off x="317338" y="2430685"/>
-            <a:ext cx="11604586" cy="4004840"/>
+            <a:ext cx="11874662" cy="4004840"/>
           </a:xfrm>
         </p:spPr>
         <p:txBody>
@@ -8898,7 +8898,7 @@
               <a:rPr lang="en-GB" dirty="0">
                 <a:latin typeface="Abadi" panose="020B0604020104020204" pitchFamily="34" charset="0"/>
               </a:rPr>
-              <a:t>100 word vectors based on the motive, target1, and </a:t>
+              <a:t>200 word vectors based on the motive (100), target1 (50), and </a:t>
             </a:r>
             <a:r>
               <a:rPr lang="en-GB" dirty="0" err="1">
@@ -8910,7 +8910,7 @@
               <a:rPr lang="en-GB" dirty="0">
                 <a:latin typeface="Abadi" panose="020B0604020104020204" pitchFamily="34" charset="0"/>
               </a:rPr>
-              <a:t> text fields included </a:t>
+              <a:t> (50) text fields</a:t>
             </a:r>
           </a:p>
           <a:p>
@@ -9252,53 +9252,6 @@
           </a:p>
         </p:txBody>
       </p:sp>
-      <p:pic>
-        <p:nvPicPr>
-          <p:cNvPr id="26626" name="Picture 2">
-            <a:extLst>
-              <a:ext uri="{FF2B5EF4-FFF2-40B4-BE49-F238E27FC236}">
-                <a16:creationId xmlns:a16="http://schemas.microsoft.com/office/drawing/2014/main" id="{C6C11EA2-7503-4AF1-905C-D98F9FB123B2}"/>
-              </a:ext>
-            </a:extLst>
-          </p:cNvPr>
-          <p:cNvPicPr>
-            <a:picLocks noChangeAspect="1" noChangeArrowheads="1"/>
-          </p:cNvPicPr>
-          <p:nvPr/>
-        </p:nvPicPr>
-        <p:blipFill>
-          <a:blip r:embed="rId3">
-            <a:extLst>
-              <a:ext uri="{28A0092B-C50C-407E-A947-70E740481C1C}">
-                <a14:useLocalDpi xmlns:a14="http://schemas.microsoft.com/office/drawing/2010/main" val="0"/>
-              </a:ext>
-            </a:extLst>
-          </a:blip>
-          <a:srcRect/>
-          <a:stretch>
-            <a:fillRect/>
-          </a:stretch>
-        </p:blipFill>
-        <p:spPr bwMode="auto">
-          <a:xfrm>
-            <a:off x="1732738" y="2430684"/>
-            <a:ext cx="8218035" cy="4202113"/>
-          </a:xfrm>
-          <a:prstGeom prst="rect">
-            <a:avLst/>
-          </a:prstGeom>
-          <a:noFill/>
-          <a:extLst>
-            <a:ext uri="{909E8E84-426E-40DD-AFC4-6F175D3DCCD1}">
-              <a14:hiddenFill xmlns:a14="http://schemas.microsoft.com/office/drawing/2010/main">
-                <a:solidFill>
-                  <a:srgbClr val="FFFFFF"/>
-                </a:solidFill>
-              </a14:hiddenFill>
-            </a:ext>
-          </a:extLst>
-        </p:spPr>
-      </p:pic>
       <p:sp>
         <p:nvSpPr>
           <p:cNvPr id="10" name="Title 1">
@@ -9315,7 +9268,7 @@
         </p:nvSpPr>
         <p:spPr>
           <a:xfrm>
-            <a:off x="1891121" y="6378924"/>
+            <a:off x="1701788" y="5036528"/>
             <a:ext cx="8409758" cy="479076"/>
           </a:xfrm>
           <a:prstGeom prst="rect">
@@ -9324,7 +9277,7 @@
         </p:spPr>
         <p:txBody>
           <a:bodyPr vert="horz" lIns="91440" tIns="45720" rIns="91440" bIns="45720" rtlCol="0" anchor="ctr">
-            <a:normAutofit fontScale="97500"/>
+            <a:normAutofit fontScale="67500" lnSpcReduction="20000"/>
           </a:bodyPr>
           <a:lstStyle>
             <a:lvl1pPr algn="l" defTabSz="914400" rtl="0" eaLnBrk="1" latinLnBrk="0" hangingPunct="1">
@@ -9350,13 +9303,13 @@
               <a:rPr lang="en-US" sz="2400" b="1" dirty="0" err="1">
                 <a:latin typeface="Abadi" panose="020B0604020104020204" pitchFamily="34" charset="0"/>
               </a:rPr>
-              <a:t>Wordcloud</a:t>
+              <a:t>WordCloud</a:t>
             </a:r>
             <a:r>
               <a:rPr lang="en-US" sz="2400" b="1" dirty="0">
                 <a:latin typeface="Abadi" panose="020B0604020104020204" pitchFamily="34" charset="0"/>
               </a:rPr>
-              <a:t> of the top 100 relevant words from the ‘motives’ field</a:t>
+              <a:t> of the top relevant words from the ‘target’, ‘weapon details’, and ‘motive’ text fields </a:t>
             </a:r>
             <a:endParaRPr lang="en-GB" sz="2400" b="1" dirty="0">
               <a:latin typeface="Abadi" panose="020B0604020104020204" pitchFamily="34" charset="0"/>
@@ -9364,6 +9317,96 @@
           </a:p>
         </p:txBody>
       </p:sp>
+      <p:pic>
+        <p:nvPicPr>
+          <p:cNvPr id="2" name="Picture 1">
+            <a:extLst>
+              <a:ext uri="{FF2B5EF4-FFF2-40B4-BE49-F238E27FC236}">
+                <a16:creationId xmlns:a16="http://schemas.microsoft.com/office/drawing/2014/main" id="{DE6D1E28-331E-4F80-8CF7-BCE15FCA1362}"/>
+              </a:ext>
+            </a:extLst>
+          </p:cNvPr>
+          <p:cNvPicPr>
+            <a:picLocks noChangeAspect="1"/>
+          </p:cNvPicPr>
+          <p:nvPr/>
+        </p:nvPicPr>
+        <p:blipFill>
+          <a:blip r:embed="rId3"/>
+          <a:stretch>
+            <a:fillRect/>
+          </a:stretch>
+        </p:blipFill>
+        <p:spPr>
+          <a:xfrm>
+            <a:off x="0" y="2993570"/>
+            <a:ext cx="3940811" cy="2044266"/>
+          </a:xfrm>
+          <a:prstGeom prst="rect">
+            <a:avLst/>
+          </a:prstGeom>
+        </p:spPr>
+      </p:pic>
+      <p:pic>
+        <p:nvPicPr>
+          <p:cNvPr id="3" name="Picture 2">
+            <a:extLst>
+              <a:ext uri="{FF2B5EF4-FFF2-40B4-BE49-F238E27FC236}">
+                <a16:creationId xmlns:a16="http://schemas.microsoft.com/office/drawing/2014/main" id="{48E01D21-20C0-431A-BABF-C5E4E98AEF53}"/>
+              </a:ext>
+            </a:extLst>
+          </p:cNvPr>
+          <p:cNvPicPr>
+            <a:picLocks noChangeAspect="1"/>
+          </p:cNvPicPr>
+          <p:nvPr/>
+        </p:nvPicPr>
+        <p:blipFill>
+          <a:blip r:embed="rId4"/>
+          <a:stretch>
+            <a:fillRect/>
+          </a:stretch>
+        </p:blipFill>
+        <p:spPr>
+          <a:xfrm>
+            <a:off x="3868317" y="2955275"/>
+            <a:ext cx="4076701" cy="2120856"/>
+          </a:xfrm>
+          <a:prstGeom prst="rect">
+            <a:avLst/>
+          </a:prstGeom>
+        </p:spPr>
+      </p:pic>
+      <p:pic>
+        <p:nvPicPr>
+          <p:cNvPr id="4" name="Picture 3">
+            <a:extLst>
+              <a:ext uri="{FF2B5EF4-FFF2-40B4-BE49-F238E27FC236}">
+                <a16:creationId xmlns:a16="http://schemas.microsoft.com/office/drawing/2014/main" id="{4ED516DF-FCF8-4E56-9D4B-17BFE694E843}"/>
+              </a:ext>
+            </a:extLst>
+          </p:cNvPr>
+          <p:cNvPicPr>
+            <a:picLocks noChangeAspect="1"/>
+          </p:cNvPicPr>
+          <p:nvPr/>
+        </p:nvPicPr>
+        <p:blipFill>
+          <a:blip r:embed="rId5"/>
+          <a:stretch>
+            <a:fillRect/>
+          </a:stretch>
+        </p:blipFill>
+        <p:spPr>
+          <a:xfrm>
+            <a:off x="7840050" y="2940827"/>
+            <a:ext cx="4076702" cy="2097009"/>
+          </a:xfrm>
+          <a:prstGeom prst="rect">
+            <a:avLst/>
+          </a:prstGeom>
+        </p:spPr>
+      </p:pic>
     </p:spTree>
     <p:extLst>
       <p:ext uri="{BB962C8B-B14F-4D97-AF65-F5344CB8AC3E}">
@@ -9790,7 +9833,7 @@
               <a:rPr lang="en-US" sz="3600" b="1" dirty="0">
                 <a:latin typeface="Abadi" panose="020B0604020104020204" pitchFamily="34" charset="0"/>
               </a:rPr>
-              <a:t>Unfortunately these NLP derived features did seem to show any statistically significant improvement and served to increase run-time dramatically suggesting more work would be needed to improve the process if they were to be included in a future model…</a:t>
+              <a:t>While the NLP derived features did show some improvement, this was not statistically significant and served to increase run-time dramatically suggesting more work would be needed to improve the process if they were to be included in a future model…</a:t>
             </a:r>
             <a:endParaRPr lang="en-GB" sz="3600" b="1" dirty="0">
               <a:latin typeface="Abadi" panose="020B0604020104020204" pitchFamily="34" charset="0"/>
@@ -9800,10 +9843,10 @@
       </p:sp>
       <p:pic>
         <p:nvPicPr>
-          <p:cNvPr id="2" name="Picture 1">
-            <a:extLst>
-              <a:ext uri="{FF2B5EF4-FFF2-40B4-BE49-F238E27FC236}">
-                <a16:creationId xmlns:a16="http://schemas.microsoft.com/office/drawing/2014/main" id="{67ED1A1E-49E4-49AB-89BF-72AB10AFC82D}"/>
+          <p:cNvPr id="3" name="Picture 2">
+            <a:extLst>
+              <a:ext uri="{FF2B5EF4-FFF2-40B4-BE49-F238E27FC236}">
+                <a16:creationId xmlns:a16="http://schemas.microsoft.com/office/drawing/2014/main" id="{7FED0331-645D-4013-A86F-BFF1EBEC31D7}"/>
               </a:ext>
             </a:extLst>
           </p:cNvPr>
@@ -9820,8 +9863,8 @@
         </p:blipFill>
         <p:spPr>
           <a:xfrm>
-            <a:off x="2247900" y="2807378"/>
-            <a:ext cx="7696200" cy="3924300"/>
+            <a:off x="2332654" y="2819954"/>
+            <a:ext cx="7263298" cy="3775834"/>
           </a:xfrm>
           <a:prstGeom prst="rect">
             <a:avLst/>
@@ -10000,8 +10043,8 @@
         </p:nvGrpSpPr>
         <p:grpSpPr>
           <a:xfrm>
-            <a:off x="2989617" y="3429000"/>
-            <a:ext cx="5763766" cy="1933087"/>
+            <a:off x="974204" y="3679802"/>
+            <a:ext cx="5028291" cy="1686419"/>
             <a:chOff x="1897663" y="2866592"/>
             <a:chExt cx="7731911" cy="2593175"/>
           </a:xfrm>
@@ -10136,6 +10179,196 @@
                 <a:latin typeface="Abadi" panose="020B0604020104020204" pitchFamily="34" charset="0"/>
               </a:rPr>
               <a:t>Ultimately Bagging Classifiers were selected as the final model because of the large run-time savings for essentially the same final performance </a:t>
+            </a:r>
+          </a:p>
+        </p:txBody>
+      </p:sp>
+      <p:pic>
+        <p:nvPicPr>
+          <p:cNvPr id="2" name="Picture 1">
+            <a:extLst>
+              <a:ext uri="{FF2B5EF4-FFF2-40B4-BE49-F238E27FC236}">
+                <a16:creationId xmlns:a16="http://schemas.microsoft.com/office/drawing/2014/main" id="{558F1140-C944-4C95-BBC4-C7028A3742F2}"/>
+              </a:ext>
+            </a:extLst>
+          </p:cNvPr>
+          <p:cNvPicPr>
+            <a:picLocks noChangeAspect="1"/>
+          </p:cNvPicPr>
+          <p:nvPr/>
+        </p:nvPicPr>
+        <p:blipFill>
+          <a:blip r:embed="rId4"/>
+          <a:stretch>
+            <a:fillRect/>
+          </a:stretch>
+        </p:blipFill>
+        <p:spPr>
+          <a:xfrm>
+            <a:off x="6233998" y="3687145"/>
+            <a:ext cx="5363834" cy="627557"/>
+          </a:xfrm>
+          <a:prstGeom prst="rect">
+            <a:avLst/>
+          </a:prstGeom>
+          <a:ln>
+            <a:solidFill>
+              <a:schemeClr val="tx1"/>
+            </a:solidFill>
+          </a:ln>
+        </p:spPr>
+      </p:pic>
+      <p:cxnSp>
+        <p:nvCxnSpPr>
+          <p:cNvPr id="11" name="Straight Connector 10">
+            <a:extLst>
+              <a:ext uri="{FF2B5EF4-FFF2-40B4-BE49-F238E27FC236}">
+                <a16:creationId xmlns:a16="http://schemas.microsoft.com/office/drawing/2014/main" id="{C48616E0-30B0-4D00-80A1-114F79D16C6D}"/>
+              </a:ext>
+            </a:extLst>
+          </p:cNvPr>
+          <p:cNvCxnSpPr>
+            <a:cxnSpLocks/>
+          </p:cNvCxnSpPr>
+          <p:nvPr/>
+        </p:nvCxnSpPr>
+        <p:spPr>
+          <a:xfrm>
+            <a:off x="9785649" y="4249248"/>
+            <a:ext cx="1270150" cy="0"/>
+          </a:xfrm>
+          <a:prstGeom prst="line">
+            <a:avLst/>
+          </a:prstGeom>
+          <a:ln w="57150">
+            <a:solidFill>
+              <a:srgbClr val="FF0000"/>
+            </a:solidFill>
+          </a:ln>
+        </p:spPr>
+        <p:style>
+          <a:lnRef idx="1">
+            <a:schemeClr val="accent1"/>
+          </a:lnRef>
+          <a:fillRef idx="0">
+            <a:schemeClr val="accent1"/>
+          </a:fillRef>
+          <a:effectRef idx="0">
+            <a:schemeClr val="accent1"/>
+          </a:effectRef>
+          <a:fontRef idx="minor">
+            <a:schemeClr val="tx1"/>
+          </a:fontRef>
+        </p:style>
+      </p:cxnSp>
+      <p:sp>
+        <p:nvSpPr>
+          <p:cNvPr id="13" name="Title 1">
+            <a:extLst>
+              <a:ext uri="{FF2B5EF4-FFF2-40B4-BE49-F238E27FC236}">
+                <a16:creationId xmlns:a16="http://schemas.microsoft.com/office/drawing/2014/main" id="{165EA01E-DCA6-4D76-9C7D-9F77890C6FF7}"/>
+              </a:ext>
+            </a:extLst>
+          </p:cNvPr>
+          <p:cNvSpPr txBox="1">
+            <a:spLocks/>
+          </p:cNvSpPr>
+          <p:nvPr/>
+        </p:nvSpPr>
+        <p:spPr>
+          <a:xfrm>
+            <a:off x="3006012" y="3335690"/>
+            <a:ext cx="754226" cy="351447"/>
+          </a:xfrm>
+          <a:prstGeom prst="rect">
+            <a:avLst/>
+          </a:prstGeom>
+        </p:spPr>
+        <p:txBody>
+          <a:bodyPr vert="horz" lIns="91440" tIns="45720" rIns="91440" bIns="45720" rtlCol="0" anchor="ctr">
+            <a:normAutofit fontScale="75000" lnSpcReduction="20000"/>
+          </a:bodyPr>
+          <a:lstStyle>
+            <a:lvl1pPr algn="l" defTabSz="914400" rtl="0" eaLnBrk="1" latinLnBrk="0" hangingPunct="1">
+              <a:lnSpc>
+                <a:spcPct val="90000"/>
+              </a:lnSpc>
+              <a:spcBef>
+                <a:spcPct val="0"/>
+              </a:spcBef>
+              <a:buNone/>
+              <a:defRPr sz="4400" kern="1200">
+                <a:solidFill>
+                  <a:schemeClr val="tx1"/>
+                </a:solidFill>
+                <a:latin typeface="+mj-lt"/>
+                <a:ea typeface="+mj-ea"/>
+                <a:cs typeface="+mj-cs"/>
+              </a:defRPr>
+            </a:lvl1pPr>
+          </a:lstStyle>
+          <a:p>
+            <a:r>
+              <a:rPr lang="en-US" sz="2800" dirty="0">
+                <a:latin typeface="Abadi" panose="020B0604020104020204" pitchFamily="34" charset="0"/>
+              </a:rPr>
+              <a:t>V2</a:t>
+            </a:r>
+          </a:p>
+        </p:txBody>
+      </p:sp>
+      <p:sp>
+        <p:nvSpPr>
+          <p:cNvPr id="16" name="Title 1">
+            <a:extLst>
+              <a:ext uri="{FF2B5EF4-FFF2-40B4-BE49-F238E27FC236}">
+                <a16:creationId xmlns:a16="http://schemas.microsoft.com/office/drawing/2014/main" id="{15645085-7E11-45C9-804C-D75EEEEAA8ED}"/>
+              </a:ext>
+            </a:extLst>
+          </p:cNvPr>
+          <p:cNvSpPr txBox="1">
+            <a:spLocks/>
+          </p:cNvSpPr>
+          <p:nvPr/>
+        </p:nvSpPr>
+        <p:spPr>
+          <a:xfrm>
+            <a:off x="8720134" y="3342529"/>
+            <a:ext cx="754226" cy="351447"/>
+          </a:xfrm>
+          <a:prstGeom prst="rect">
+            <a:avLst/>
+          </a:prstGeom>
+        </p:spPr>
+        <p:txBody>
+          <a:bodyPr vert="horz" lIns="91440" tIns="45720" rIns="91440" bIns="45720" rtlCol="0" anchor="ctr">
+            <a:normAutofit fontScale="75000" lnSpcReduction="20000"/>
+          </a:bodyPr>
+          <a:lstStyle>
+            <a:lvl1pPr algn="l" defTabSz="914400" rtl="0" eaLnBrk="1" latinLnBrk="0" hangingPunct="1">
+              <a:lnSpc>
+                <a:spcPct val="90000"/>
+              </a:lnSpc>
+              <a:spcBef>
+                <a:spcPct val="0"/>
+              </a:spcBef>
+              <a:buNone/>
+              <a:defRPr sz="4400" kern="1200">
+                <a:solidFill>
+                  <a:schemeClr val="tx1"/>
+                </a:solidFill>
+                <a:latin typeface="+mj-lt"/>
+                <a:ea typeface="+mj-ea"/>
+                <a:cs typeface="+mj-cs"/>
+              </a:defRPr>
+            </a:lvl1pPr>
+          </a:lstStyle>
+          <a:p>
+            <a:r>
+              <a:rPr lang="en-US" sz="2800" dirty="0">
+                <a:latin typeface="Abadi" panose="020B0604020104020204" pitchFamily="34" charset="0"/>
+              </a:rPr>
+              <a:t>V3</a:t>
             </a:r>
           </a:p>
         </p:txBody>

</xml_diff>